<commit_message>
Things I did on 27-09 during class
</commit_message>
<xml_diff>
--- a/docs/Pres discussie voortgang 27 september.pptx
+++ b/docs/Pres discussie voortgang 27 september.pptx
@@ -122,7 +122,7 @@
 <file path=ppt/revisionInfo.xml><?xml version="1.0" encoding="utf-8"?>
 <p1510:revInfo xmlns:a="http://schemas.openxmlformats.org/drawingml/2006/main" xmlns:r="http://schemas.openxmlformats.org/officeDocument/2006/relationships" xmlns:p1510="http://schemas.microsoft.com/office/powerpoint/2015/10/main">
   <p1510:revLst>
-    <p1510:client id="{34A641ED-9C34-45B6-B15E-F6FEB247B233}" v="383" dt="2023-09-27T05:39:38.451"/>
+    <p1510:client id="{34A641ED-9C34-45B6-B15E-F6FEB247B233}" v="391" dt="2023-09-27T07:20:23.609"/>
   </p1510:revLst>
 </p1510:revInfo>
 </file>
@@ -132,7 +132,7 @@
   <pc:docChgLst>
     <pc:chgData name="Stijn Van Helmondt" userId="d8319cc9cc788b33" providerId="LiveId" clId="{34A641ED-9C34-45B6-B15E-F6FEB247B233}"/>
     <pc:docChg chg="undo custSel addSld delSld modSld">
-      <pc:chgData name="Stijn Van Helmondt" userId="d8319cc9cc788b33" providerId="LiveId" clId="{34A641ED-9C34-45B6-B15E-F6FEB247B233}" dt="2023-09-27T05:53:50.671" v="1122" actId="47"/>
+      <pc:chgData name="Stijn Van Helmondt" userId="d8319cc9cc788b33" providerId="LiveId" clId="{34A641ED-9C34-45B6-B15E-F6FEB247B233}" dt="2023-09-27T07:20:23.609" v="1163"/>
       <pc:docMkLst>
         <pc:docMk/>
       </pc:docMkLst>
@@ -144,7 +144,7 @@
         </pc:sldMkLst>
       </pc:sldChg>
       <pc:sldChg chg="delSp modSp mod">
-        <pc:chgData name="Stijn Van Helmondt" userId="d8319cc9cc788b33" providerId="LiveId" clId="{34A641ED-9C34-45B6-B15E-F6FEB247B233}" dt="2023-09-27T05:53:40.902" v="1104" actId="403"/>
+        <pc:chgData name="Stijn Van Helmondt" userId="d8319cc9cc788b33" providerId="LiveId" clId="{34A641ED-9C34-45B6-B15E-F6FEB247B233}" dt="2023-09-27T07:19:56.191" v="1160" actId="5793"/>
         <pc:sldMkLst>
           <pc:docMk/>
           <pc:sldMk cId="891059174" sldId="257"/>
@@ -158,7 +158,7 @@
           </ac:spMkLst>
         </pc:spChg>
         <pc:spChg chg="mod">
-          <ac:chgData name="Stijn Van Helmondt" userId="d8319cc9cc788b33" providerId="LiveId" clId="{34A641ED-9C34-45B6-B15E-F6FEB247B233}" dt="2023-09-27T05:53:40.902" v="1104" actId="403"/>
+          <ac:chgData name="Stijn Van Helmondt" userId="d8319cc9cc788b33" providerId="LiveId" clId="{34A641ED-9C34-45B6-B15E-F6FEB247B233}" dt="2023-09-27T07:19:56.191" v="1160" actId="5793"/>
           <ac:spMkLst>
             <pc:docMk/>
             <pc:sldMk cId="891059174" sldId="257"/>
@@ -425,8 +425,8 @@
           <pc:sldMk cId="720443389" sldId="526"/>
         </pc:sldMkLst>
       </pc:sldChg>
-      <pc:sldChg chg="delSp modSp mod delAnim modAnim">
-        <pc:chgData name="Stijn Van Helmondt" userId="d8319cc9cc788b33" providerId="LiveId" clId="{34A641ED-9C34-45B6-B15E-F6FEB247B233}" dt="2023-09-27T05:39:38.451" v="868" actId="20577"/>
+      <pc:sldChg chg="delSp modSp mod modTransition delAnim modAnim">
+        <pc:chgData name="Stijn Van Helmondt" userId="d8319cc9cc788b33" providerId="LiveId" clId="{34A641ED-9C34-45B6-B15E-F6FEB247B233}" dt="2023-09-27T07:20:23.609" v="1163"/>
         <pc:sldMkLst>
           <pc:docMk/>
           <pc:sldMk cId="3009616284" sldId="527"/>
@@ -456,7 +456,7 @@
           </ac:spMkLst>
         </pc:spChg>
         <pc:spChg chg="mod">
-          <ac:chgData name="Stijn Van Helmondt" userId="d8319cc9cc788b33" providerId="LiveId" clId="{34A641ED-9C34-45B6-B15E-F6FEB247B233}" dt="2023-09-27T05:39:38.451" v="868" actId="20577"/>
+          <ac:chgData name="Stijn Van Helmondt" userId="d8319cc9cc788b33" providerId="LiveId" clId="{34A641ED-9C34-45B6-B15E-F6FEB247B233}" dt="2023-09-27T07:17:10.914" v="1128" actId="20577"/>
           <ac:spMkLst>
             <pc:docMk/>
             <pc:sldMk cId="3009616284" sldId="527"/>
@@ -660,7 +660,7 @@
           <a:p>
             <a:fld id="{FC2E51FA-859B-4101-82BD-80402017FD24}" type="datetimeFigureOut">
               <a:rPr lang="da-DK" smtClean="0"/>
-              <a:t>26-09-2023</a:t>
+              <a:t>27-09-2023</a:t>
             </a:fld>
             <a:endParaRPr lang="da-DK"/>
           </a:p>
@@ -1074,7 +1074,7 @@
           <a:p>
             <a:fld id="{0975A34E-C9B9-4304-AD7B-C5ACAA0459EC}" type="datetimeFigureOut">
               <a:rPr lang="da-DK" smtClean="0"/>
-              <a:t>26-09-2023</a:t>
+              <a:t>27-09-2023</a:t>
             </a:fld>
             <a:endParaRPr lang="da-DK"/>
           </a:p>
@@ -1272,7 +1272,7 @@
           <a:p>
             <a:fld id="{0975A34E-C9B9-4304-AD7B-C5ACAA0459EC}" type="datetimeFigureOut">
               <a:rPr lang="da-DK" smtClean="0"/>
-              <a:t>26-09-2023</a:t>
+              <a:t>27-09-2023</a:t>
             </a:fld>
             <a:endParaRPr lang="da-DK"/>
           </a:p>
@@ -1480,7 +1480,7 @@
           <a:p>
             <a:fld id="{0975A34E-C9B9-4304-AD7B-C5ACAA0459EC}" type="datetimeFigureOut">
               <a:rPr lang="da-DK" smtClean="0"/>
-              <a:t>26-09-2023</a:t>
+              <a:t>27-09-2023</a:t>
             </a:fld>
             <a:endParaRPr lang="da-DK"/>
           </a:p>
@@ -1678,7 +1678,7 @@
           <a:p>
             <a:fld id="{0975A34E-C9B9-4304-AD7B-C5ACAA0459EC}" type="datetimeFigureOut">
               <a:rPr lang="da-DK" smtClean="0"/>
-              <a:t>26-09-2023</a:t>
+              <a:t>27-09-2023</a:t>
             </a:fld>
             <a:endParaRPr lang="da-DK"/>
           </a:p>
@@ -1953,7 +1953,7 @@
           <a:p>
             <a:fld id="{0975A34E-C9B9-4304-AD7B-C5ACAA0459EC}" type="datetimeFigureOut">
               <a:rPr lang="da-DK" smtClean="0"/>
-              <a:t>26-09-2023</a:t>
+              <a:t>27-09-2023</a:t>
             </a:fld>
             <a:endParaRPr lang="da-DK"/>
           </a:p>
@@ -2218,7 +2218,7 @@
           <a:p>
             <a:fld id="{0975A34E-C9B9-4304-AD7B-C5ACAA0459EC}" type="datetimeFigureOut">
               <a:rPr lang="da-DK" smtClean="0"/>
-              <a:t>26-09-2023</a:t>
+              <a:t>27-09-2023</a:t>
             </a:fld>
             <a:endParaRPr lang="da-DK"/>
           </a:p>
@@ -2630,7 +2630,7 @@
           <a:p>
             <a:fld id="{0975A34E-C9B9-4304-AD7B-C5ACAA0459EC}" type="datetimeFigureOut">
               <a:rPr lang="da-DK" smtClean="0"/>
-              <a:t>26-09-2023</a:t>
+              <a:t>27-09-2023</a:t>
             </a:fld>
             <a:endParaRPr lang="da-DK"/>
           </a:p>
@@ -2771,7 +2771,7 @@
           <a:p>
             <a:fld id="{0975A34E-C9B9-4304-AD7B-C5ACAA0459EC}" type="datetimeFigureOut">
               <a:rPr lang="da-DK" smtClean="0"/>
-              <a:t>26-09-2023</a:t>
+              <a:t>27-09-2023</a:t>
             </a:fld>
             <a:endParaRPr lang="da-DK"/>
           </a:p>
@@ -2884,7 +2884,7 @@
           <a:p>
             <a:fld id="{0975A34E-C9B9-4304-AD7B-C5ACAA0459EC}" type="datetimeFigureOut">
               <a:rPr lang="da-DK" smtClean="0"/>
-              <a:t>26-09-2023</a:t>
+              <a:t>27-09-2023</a:t>
             </a:fld>
             <a:endParaRPr lang="da-DK"/>
           </a:p>
@@ -3195,7 +3195,7 @@
           <a:p>
             <a:fld id="{0975A34E-C9B9-4304-AD7B-C5ACAA0459EC}" type="datetimeFigureOut">
               <a:rPr lang="da-DK" smtClean="0"/>
-              <a:t>26-09-2023</a:t>
+              <a:t>27-09-2023</a:t>
             </a:fld>
             <a:endParaRPr lang="da-DK"/>
           </a:p>
@@ -3483,7 +3483,7 @@
           <a:p>
             <a:fld id="{0975A34E-C9B9-4304-AD7B-C5ACAA0459EC}" type="datetimeFigureOut">
               <a:rPr lang="da-DK" smtClean="0"/>
-              <a:t>26-09-2023</a:t>
+              <a:t>27-09-2023</a:t>
             </a:fld>
             <a:endParaRPr lang="da-DK"/>
           </a:p>
@@ -3724,7 +3724,7 @@
           <a:p>
             <a:fld id="{0975A34E-C9B9-4304-AD7B-C5ACAA0459EC}" type="datetimeFigureOut">
               <a:rPr lang="da-DK" smtClean="0"/>
-              <a:t>26-09-2023</a:t>
+              <a:t>27-09-2023</a:t>
             </a:fld>
             <a:endParaRPr lang="da-DK"/>
           </a:p>
@@ -4221,14 +4221,14 @@
           </a:ln>
           <a:extLst>
             <a:ext uri="{909E8E84-426E-40dd-AFC4-6F175D3DCCD1}">
-              <a14:hiddenFill xmlns="" xmlns:a14="http://schemas.microsoft.com/office/drawing/2010/main" xmlns:lc="http://schemas.openxmlformats.org/drawingml/2006/lockedCanvas">
+              <a14:hiddenFill xmlns:lc="http://schemas.openxmlformats.org/drawingml/2006/lockedCanvas" xmlns:a14="http://schemas.microsoft.com/office/drawing/2010/main" xmlns="">
                 <a:solidFill>
                   <a:srgbClr val="FFFFFF"/>
                 </a:solidFill>
               </a14:hiddenFill>
             </a:ext>
             <a:ext uri="{91240B29-F687-4f45-9708-019B960494DF}">
-              <a14:hiddenLine xmlns="" xmlns:a14="http://schemas.microsoft.com/office/drawing/2010/main" xmlns:lc="http://schemas.openxmlformats.org/drawingml/2006/lockedCanvas" w="9525">
+              <a14:hiddenLine xmlns:lc="http://schemas.openxmlformats.org/drawingml/2006/lockedCanvas" xmlns:a14="http://schemas.microsoft.com/office/drawing/2010/main" xmlns="" w="9525">
                 <a:solidFill>
                   <a:srgbClr val="000000"/>
                 </a:solidFill>
@@ -4238,7 +4238,7 @@
               </a14:hiddenLine>
             </a:ext>
             <a:ext uri="{FAA26D3D-D897-4be2-8F04-BA451C77F1D7}">
-              <ma14:placeholderFlag xmlns="" xmlns:ma14="http://schemas.microsoft.com/office/mac/drawingml/2011/main" xmlns:lc="http://schemas.openxmlformats.org/drawingml/2006/lockedCanvas" val="1"/>
+              <ma14:placeholderFlag xmlns:lc="http://schemas.openxmlformats.org/drawingml/2006/lockedCanvas" xmlns:ma14="http://schemas.microsoft.com/office/mac/drawingml/2011/main" xmlns="" val="1"/>
             </a:ext>
           </a:extLst>
         </p:spPr>
@@ -4432,14 +4432,14 @@
           </a:ln>
           <a:extLst>
             <a:ext uri="{909E8E84-426E-40dd-AFC4-6F175D3DCCD1}">
-              <a14:hiddenFill xmlns="" xmlns:a14="http://schemas.microsoft.com/office/drawing/2010/main" xmlns:lc="http://schemas.openxmlformats.org/drawingml/2006/lockedCanvas">
+              <a14:hiddenFill xmlns:lc="http://schemas.openxmlformats.org/drawingml/2006/lockedCanvas" xmlns:a14="http://schemas.microsoft.com/office/drawing/2010/main" xmlns="">
                 <a:solidFill>
                   <a:srgbClr val="FFFFFF"/>
                 </a:solidFill>
               </a14:hiddenFill>
             </a:ext>
             <a:ext uri="{91240B29-F687-4f45-9708-019B960494DF}">
-              <a14:hiddenLine xmlns="" xmlns:a14="http://schemas.microsoft.com/office/drawing/2010/main" xmlns:lc="http://schemas.openxmlformats.org/drawingml/2006/lockedCanvas" w="9525">
+              <a14:hiddenLine xmlns:lc="http://schemas.openxmlformats.org/drawingml/2006/lockedCanvas" xmlns:a14="http://schemas.microsoft.com/office/drawing/2010/main" xmlns="" w="9525">
                 <a:solidFill>
                   <a:srgbClr val="000000"/>
                 </a:solidFill>
@@ -4449,7 +4449,7 @@
               </a14:hiddenLine>
             </a:ext>
             <a:ext uri="{FAA26D3D-D897-4be2-8F04-BA451C77F1D7}">
-              <ma14:placeholderFlag xmlns="" xmlns:ma14="http://schemas.microsoft.com/office/mac/drawingml/2011/main" xmlns:lc="http://schemas.openxmlformats.org/drawingml/2006/lockedCanvas" val="1"/>
+              <ma14:placeholderFlag xmlns:lc="http://schemas.openxmlformats.org/drawingml/2006/lockedCanvas" xmlns:ma14="http://schemas.microsoft.com/office/mac/drawingml/2011/main" xmlns="" val="1"/>
             </a:ext>
           </a:extLst>
         </p:spPr>
@@ -4948,7 +4948,7 @@
             </a:pPr>
             <a:r>
               <a:rPr lang="da-DK" dirty="0"/>
-              <a:t>Problemen met vinden literatuur die SNA volgt </a:t>
+              <a:t>Problemen met vinden literatuur die SNA volgt</a:t>
             </a:r>
           </a:p>
           <a:p>
@@ -5231,6 +5231,14 @@
   <p:clrMapOvr>
     <a:masterClrMapping/>
   </p:clrMapOvr>
+  <mc:AlternateContent xmlns:mc="http://schemas.openxmlformats.org/markup-compatibility/2006">
+    <mc:Choice xmlns:p14="http://schemas.microsoft.com/office/powerpoint/2010/main" Requires="p14">
+      <p:transition p14:dur="10"/>
+    </mc:Choice>
+    <mc:Fallback>
+      <p:transition/>
+    </mc:Fallback>
+  </mc:AlternateContent>
   <p:timing>
     <p:tnLst>
       <p:par>
@@ -5722,6 +5730,24 @@
             <a:r>
               <a:rPr lang="en-US" dirty="0"/>
               <a:t> per week</a:t>
+            </a:r>
+          </a:p>
+          <a:p>
+            <a:pPr marL="285750" indent="-285750" algn="l">
+              <a:buFont typeface="Arial" panose="020B0604020202020204" pitchFamily="34" charset="0"/>
+              <a:buChar char="•"/>
+            </a:pPr>
+            <a:r>
+              <a:rPr lang="en-US" dirty="0"/>
+              <a:t>Percentage </a:t>
+            </a:r>
+            <a:r>
+              <a:rPr lang="en-US" dirty="0" err="1"/>
+              <a:t>vrouwen</a:t>
+            </a:r>
+            <a:r>
+              <a:rPr lang="en-US" dirty="0"/>
+              <a:t> in network?</a:t>
             </a:r>
           </a:p>
         </p:txBody>

</xml_diff>